<commit_message>
final presentation, final version
</commit_message>
<xml_diff>
--- a/presentation/final_presentation.pptx
+++ b/presentation/final_presentation.pptx
@@ -287,7 +287,7 @@
             <a:fld id="{17A39E9D-B438-D94D-AF2A-93757548558C}" type="datetime1">
               <a:rPr lang="nl-NL" altLang="nl-NL"/>
               <a:pPr/>
-              <a:t>20-6-2018</a:t>
+              <a:t>26-6-2018</a:t>
             </a:fld>
             <a:endParaRPr lang="nl-NL" altLang="nl-NL"/>
           </a:p>
@@ -499,7 +499,7 @@
             <a:fld id="{3AA95554-0BC3-EC48-BCE0-DB850053191D}" type="datetime1">
               <a:rPr lang="nl-NL" altLang="nl-NL"/>
               <a:pPr/>
-              <a:t>20-6-2018</a:t>
+              <a:t>26-6-2018</a:t>
             </a:fld>
             <a:endParaRPr lang="nl-NL" altLang="nl-NL"/>
           </a:p>
@@ -821,6 +821,337 @@
 </p:notesMaster>
 </file>
 
+<file path=ppt/notesSlides/notesSlide1.xml><?xml version="1.0" encoding="utf-8"?>
+<p:notes xmlns:a="http://schemas.openxmlformats.org/drawingml/2006/main" xmlns:r="http://schemas.openxmlformats.org/officeDocument/2006/relationships" xmlns:p="http://schemas.openxmlformats.org/presentationml/2006/main">
+  <p:cSld>
+    <p:spTree>
+      <p:nvGrpSpPr>
+        <p:cNvPr id="1" name=""/>
+        <p:cNvGrpSpPr/>
+        <p:nvPr/>
+      </p:nvGrpSpPr>
+      <p:grpSpPr>
+        <a:xfrm>
+          <a:off x="0" y="0"/>
+          <a:ext cx="0" cy="0"/>
+          <a:chOff x="0" y="0"/>
+          <a:chExt cx="0" cy="0"/>
+        </a:xfrm>
+      </p:grpSpPr>
+      <p:sp>
+        <p:nvSpPr>
+          <p:cNvPr id="2" name="Slide Image Placeholder 1"/>
+          <p:cNvSpPr>
+            <a:spLocks noGrp="1" noRot="1" noChangeAspect="1"/>
+          </p:cNvSpPr>
+          <p:nvPr>
+            <p:ph type="sldImg"/>
+          </p:nvPr>
+        </p:nvSpPr>
+        <p:spPr/>
+      </p:sp>
+      <p:sp>
+        <p:nvSpPr>
+          <p:cNvPr id="3" name="Notes Placeholder 2"/>
+          <p:cNvSpPr>
+            <a:spLocks noGrp="1"/>
+          </p:cNvSpPr>
+          <p:nvPr>
+            <p:ph type="body" idx="1"/>
+          </p:nvPr>
+        </p:nvSpPr>
+        <p:spPr/>
+        <p:txBody>
+          <a:bodyPr/>
+          <a:lstStyle/>
+          <a:p>
+            <a:r>
+              <a:rPr lang="en-GB" dirty="0"/>
+              <a:t>Plaatje </a:t>
+            </a:r>
+            <a:r>
+              <a:rPr lang="en-GB" dirty="0" err="1"/>
+              <a:t>toevoegen</a:t>
+            </a:r>
+            <a:r>
+              <a:rPr lang="en-GB" dirty="0"/>
+              <a:t> object detection + </a:t>
+            </a:r>
+            <a:r>
+              <a:rPr lang="en-GB" dirty="0" err="1"/>
+              <a:t>xception</a:t>
+            </a:r>
+            <a:r>
+              <a:rPr lang="en-GB" dirty="0"/>
+              <a:t> </a:t>
+            </a:r>
+            <a:r>
+              <a:rPr lang="en-GB" dirty="0" err="1"/>
+              <a:t>structuur</a:t>
+            </a:r>
+            <a:endParaRPr lang="en-NL" dirty="0"/>
+          </a:p>
+        </p:txBody>
+      </p:sp>
+    </p:spTree>
+    <p:extLst>
+      <p:ext uri="{BB962C8B-B14F-4D97-AF65-F5344CB8AC3E}">
+        <p14:creationId xmlns:p14="http://schemas.microsoft.com/office/powerpoint/2010/main" val="3895487659"/>
+      </p:ext>
+    </p:extLst>
+  </p:cSld>
+  <p:clrMapOvr>
+    <a:masterClrMapping/>
+  </p:clrMapOvr>
+</p:notes>
+</file>
+
+<file path=ppt/notesSlides/notesSlide2.xml><?xml version="1.0" encoding="utf-8"?>
+<p:notes xmlns:a="http://schemas.openxmlformats.org/drawingml/2006/main" xmlns:r="http://schemas.openxmlformats.org/officeDocument/2006/relationships" xmlns:p="http://schemas.openxmlformats.org/presentationml/2006/main">
+  <p:cSld>
+    <p:spTree>
+      <p:nvGrpSpPr>
+        <p:cNvPr id="1" name=""/>
+        <p:cNvGrpSpPr/>
+        <p:nvPr/>
+      </p:nvGrpSpPr>
+      <p:grpSpPr>
+        <a:xfrm>
+          <a:off x="0" y="0"/>
+          <a:ext cx="0" cy="0"/>
+          <a:chOff x="0" y="0"/>
+          <a:chExt cx="0" cy="0"/>
+        </a:xfrm>
+      </p:grpSpPr>
+      <p:sp>
+        <p:nvSpPr>
+          <p:cNvPr id="2" name="Slide Image Placeholder 1"/>
+          <p:cNvSpPr>
+            <a:spLocks noGrp="1" noRot="1" noChangeAspect="1"/>
+          </p:cNvSpPr>
+          <p:nvPr>
+            <p:ph type="sldImg"/>
+          </p:nvPr>
+        </p:nvSpPr>
+        <p:spPr/>
+      </p:sp>
+      <p:sp>
+        <p:nvSpPr>
+          <p:cNvPr id="3" name="Notes Placeholder 2"/>
+          <p:cNvSpPr>
+            <a:spLocks noGrp="1"/>
+          </p:cNvSpPr>
+          <p:nvPr>
+            <p:ph type="body" idx="1"/>
+          </p:nvPr>
+        </p:nvSpPr>
+        <p:spPr/>
+        <p:txBody>
+          <a:bodyPr/>
+          <a:lstStyle/>
+          <a:p>
+            <a:r>
+              <a:rPr lang="en-GB" dirty="0"/>
+              <a:t>Dropped lower than 500 </a:t>
+            </a:r>
+            <a:r>
+              <a:rPr lang="en-GB" dirty="0" err="1"/>
+              <a:t>occ</a:t>
+            </a:r>
+            <a:r>
+              <a:rPr lang="en-GB" dirty="0"/>
+              <a:t> + Plaatje padded  image</a:t>
+            </a:r>
+            <a:endParaRPr lang="en-NL" dirty="0"/>
+          </a:p>
+        </p:txBody>
+      </p:sp>
+    </p:spTree>
+    <p:extLst>
+      <p:ext uri="{BB962C8B-B14F-4D97-AF65-F5344CB8AC3E}">
+        <p14:creationId xmlns:p14="http://schemas.microsoft.com/office/powerpoint/2010/main" val="1873658674"/>
+      </p:ext>
+    </p:extLst>
+  </p:cSld>
+  <p:clrMapOvr>
+    <a:masterClrMapping/>
+  </p:clrMapOvr>
+</p:notes>
+</file>
+
+<file path=ppt/notesSlides/notesSlide3.xml><?xml version="1.0" encoding="utf-8"?>
+<p:notes xmlns:a="http://schemas.openxmlformats.org/drawingml/2006/main" xmlns:r="http://schemas.openxmlformats.org/officeDocument/2006/relationships" xmlns:p="http://schemas.openxmlformats.org/presentationml/2006/main">
+  <p:cSld>
+    <p:spTree>
+      <p:nvGrpSpPr>
+        <p:cNvPr id="1" name=""/>
+        <p:cNvGrpSpPr/>
+        <p:nvPr/>
+      </p:nvGrpSpPr>
+      <p:grpSpPr>
+        <a:xfrm>
+          <a:off x="0" y="0"/>
+          <a:ext cx="0" cy="0"/>
+          <a:chOff x="0" y="0"/>
+          <a:chExt cx="0" cy="0"/>
+        </a:xfrm>
+      </p:grpSpPr>
+      <p:sp>
+        <p:nvSpPr>
+          <p:cNvPr id="2" name="Slide Image Placeholder 1"/>
+          <p:cNvSpPr>
+            <a:spLocks noGrp="1" noRot="1" noChangeAspect="1"/>
+          </p:cNvSpPr>
+          <p:nvPr>
+            <p:ph type="sldImg"/>
+          </p:nvPr>
+        </p:nvSpPr>
+        <p:spPr/>
+      </p:sp>
+      <p:sp>
+        <p:nvSpPr>
+          <p:cNvPr id="3" name="Notes Placeholder 2"/>
+          <p:cNvSpPr>
+            <a:spLocks noGrp="1"/>
+          </p:cNvSpPr>
+          <p:nvPr>
+            <p:ph type="body" idx="1"/>
+          </p:nvPr>
+        </p:nvSpPr>
+        <p:spPr/>
+        <p:txBody>
+          <a:bodyPr/>
+          <a:lstStyle/>
+          <a:p>
+            <a:pPr marL="0" marR="0" lvl="0" indent="0" algn="l" defTabSz="649288" rtl="0" eaLnBrk="0" fontAlgn="base" latinLnBrk="0" hangingPunct="0">
+              <a:lnSpc>
+                <a:spcPct val="100000"/>
+              </a:lnSpc>
+              <a:spcBef>
+                <a:spcPct val="30000"/>
+              </a:spcBef>
+              <a:spcAft>
+                <a:spcPct val="0"/>
+              </a:spcAft>
+              <a:buClrTx/>
+              <a:buSzTx/>
+              <a:buFontTx/>
+              <a:buNone/>
+              <a:tabLst/>
+              <a:defRPr/>
+            </a:pPr>
+            <a:r>
+              <a:rPr lang="en-GB" dirty="0"/>
+              <a:t>PSO : Minimize the binary cross entropy</a:t>
+            </a:r>
+          </a:p>
+          <a:p>
+            <a:endParaRPr lang="en-NL" dirty="0"/>
+          </a:p>
+        </p:txBody>
+      </p:sp>
+    </p:spTree>
+    <p:extLst>
+      <p:ext uri="{BB962C8B-B14F-4D97-AF65-F5344CB8AC3E}">
+        <p14:creationId xmlns:p14="http://schemas.microsoft.com/office/powerpoint/2010/main" val="1185171426"/>
+      </p:ext>
+    </p:extLst>
+  </p:cSld>
+  <p:clrMapOvr>
+    <a:masterClrMapping/>
+  </p:clrMapOvr>
+</p:notes>
+</file>
+
+<file path=ppt/notesSlides/notesSlide4.xml><?xml version="1.0" encoding="utf-8"?>
+<p:notes xmlns:a="http://schemas.openxmlformats.org/drawingml/2006/main" xmlns:r="http://schemas.openxmlformats.org/officeDocument/2006/relationships" xmlns:p="http://schemas.openxmlformats.org/presentationml/2006/main">
+  <p:cSld>
+    <p:spTree>
+      <p:nvGrpSpPr>
+        <p:cNvPr id="1" name=""/>
+        <p:cNvGrpSpPr/>
+        <p:nvPr/>
+      </p:nvGrpSpPr>
+      <p:grpSpPr>
+        <a:xfrm>
+          <a:off x="0" y="0"/>
+          <a:ext cx="0" cy="0"/>
+          <a:chOff x="0" y="0"/>
+          <a:chExt cx="0" cy="0"/>
+        </a:xfrm>
+      </p:grpSpPr>
+      <p:sp>
+        <p:nvSpPr>
+          <p:cNvPr id="2" name="Slide Image Placeholder 1"/>
+          <p:cNvSpPr>
+            <a:spLocks noGrp="1" noRot="1" noChangeAspect="1"/>
+          </p:cNvSpPr>
+          <p:nvPr>
+            <p:ph type="sldImg"/>
+          </p:nvPr>
+        </p:nvSpPr>
+        <p:spPr/>
+      </p:sp>
+      <p:sp>
+        <p:nvSpPr>
+          <p:cNvPr id="3" name="Notes Placeholder 2"/>
+          <p:cNvSpPr>
+            <a:spLocks noGrp="1"/>
+          </p:cNvSpPr>
+          <p:nvPr>
+            <p:ph type="body" idx="1"/>
+          </p:nvPr>
+        </p:nvSpPr>
+        <p:spPr/>
+        <p:txBody>
+          <a:bodyPr/>
+          <a:lstStyle/>
+          <a:p>
+            <a:r>
+              <a:rPr lang="en-GB" dirty="0" err="1"/>
+              <a:t>Conclusie</a:t>
+            </a:r>
+            <a:r>
+              <a:rPr lang="en-GB" dirty="0"/>
+              <a:t>/reflective </a:t>
+            </a:r>
+            <a:r>
+              <a:rPr lang="en-GB" dirty="0" err="1"/>
+              <a:t>uit</a:t>
+            </a:r>
+            <a:r>
+              <a:rPr lang="en-GB" dirty="0"/>
+              <a:t> ‘t </a:t>
+            </a:r>
+            <a:r>
+              <a:rPr lang="en-GB" dirty="0" err="1"/>
+              <a:t>verslag</a:t>
+            </a:r>
+            <a:r>
+              <a:rPr lang="en-GB" dirty="0"/>
+              <a:t> </a:t>
+            </a:r>
+            <a:r>
+              <a:rPr lang="en-GB" dirty="0" err="1"/>
+              <a:t>overnemen</a:t>
+            </a:r>
+            <a:endParaRPr lang="en-NL" dirty="0"/>
+          </a:p>
+        </p:txBody>
+      </p:sp>
+    </p:spTree>
+    <p:extLst>
+      <p:ext uri="{BB962C8B-B14F-4D97-AF65-F5344CB8AC3E}">
+        <p14:creationId xmlns:p14="http://schemas.microsoft.com/office/powerpoint/2010/main" val="1919943528"/>
+      </p:ext>
+    </p:extLst>
+  </p:cSld>
+  <p:clrMapOvr>
+    <a:masterClrMapping/>
+  </p:clrMapOvr>
+</p:notes>
+</file>
+
 <file path=ppt/slideLayouts/slideLayout1.xml><?xml version="1.0" encoding="utf-8"?>
 <p:sldLayout xmlns:a="http://schemas.openxmlformats.org/drawingml/2006/main" xmlns:r="http://schemas.openxmlformats.org/officeDocument/2006/relationships" xmlns:p="http://schemas.openxmlformats.org/presentationml/2006/main" preserve="1" userDrawn="1">
   <p:cSld name="Vervolg 1">
@@ -1021,7 +1352,7 @@
           <a:p>
             <a:fld id="{9E1ED08B-741D-9E48-95DA-82644AB503BC}" type="datetime1">
               <a:rPr lang="nl-NL" altLang="nl-NL" smtClean="0"/>
-              <a:t>20-6-2018</a:t>
+              <a:t>26-6-2018</a:t>
             </a:fld>
             <a:endParaRPr lang="nl-NL" altLang="nl-NL"/>
           </a:p>
@@ -1355,7 +1686,7 @@
             <a:fld id="{9E1ED08B-741D-9E48-95DA-82644AB503BC}" type="datetime1">
               <a:rPr lang="nl-NL" altLang="nl-NL" smtClean="0"/>
               <a:pPr/>
-              <a:t>20-6-2018</a:t>
+              <a:t>26-6-2018</a:t>
             </a:fld>
             <a:endParaRPr lang="nl-NL" altLang="nl-NL" dirty="0"/>
           </a:p>
@@ -1584,7 +1915,7 @@
           <a:p>
             <a:fld id="{46CB0545-8C00-A544-A88F-C33FBC7A7630}" type="datetime1">
               <a:rPr lang="nl-NL" altLang="nl-NL" smtClean="0"/>
-              <a:t>20-6-2018</a:t>
+              <a:t>26-6-2018</a:t>
             </a:fld>
             <a:endParaRPr lang="nl-NL" altLang="nl-NL" dirty="0"/>
           </a:p>
@@ -1941,7 +2272,7 @@
           <a:p>
             <a:fld id="{46CB0545-8C00-A544-A88F-C33FBC7A7630}" type="datetime1">
               <a:rPr lang="nl-NL" altLang="nl-NL" smtClean="0"/>
-              <a:t>20-6-2018</a:t>
+              <a:t>26-6-2018</a:t>
             </a:fld>
             <a:endParaRPr lang="nl-NL" altLang="nl-NL" dirty="0"/>
           </a:p>
@@ -2400,7 +2731,7 @@
             <a:fld id="{B3873A8C-A209-FC40-86BC-D3E9A671FD81}" type="datetime1">
               <a:rPr lang="nl-NL" altLang="nl-NL" smtClean="0"/>
               <a:pPr/>
-              <a:t>20-6-2018</a:t>
+              <a:t>26-6-2018</a:t>
             </a:fld>
             <a:endParaRPr lang="nl-NL" altLang="nl-NL" dirty="0"/>
           </a:p>
@@ -3133,7 +3464,7 @@
             <a:fld id="{FB5CF2AB-20FF-5442-9E53-3C6EDD7FBCEA}" type="datetime1">
               <a:rPr lang="nl-NL" altLang="nl-NL" smtClean="0"/>
               <a:pPr/>
-              <a:t>20-6-2018</a:t>
+              <a:t>26-6-2018</a:t>
             </a:fld>
             <a:endParaRPr lang="nl-NL" altLang="nl-NL" dirty="0"/>
           </a:p>
@@ -4318,6 +4649,206 @@
             </a:r>
             <a:endParaRPr lang="en-GB" dirty="0"/>
           </a:p>
+          <a:p>
+            <a:r>
+              <a:rPr lang="en-GB" dirty="0"/>
+              <a:t>Pre-compute</a:t>
+            </a:r>
+          </a:p>
+        </p:txBody>
+      </p:sp>
+      <p:pic>
+        <p:nvPicPr>
+          <p:cNvPr id="4" name="Picture 3">
+            <a:extLst>
+              <a:ext uri="{FF2B5EF4-FFF2-40B4-BE49-F238E27FC236}">
+                <a16:creationId xmlns:a16="http://schemas.microsoft.com/office/drawing/2014/main" id="{2603A538-862E-4FC8-A4E8-6DECDC87A882}"/>
+              </a:ext>
+            </a:extLst>
+          </p:cNvPr>
+          <p:cNvPicPr>
+            <a:picLocks noChangeAspect="1"/>
+          </p:cNvPicPr>
+          <p:nvPr/>
+        </p:nvPicPr>
+        <p:blipFill>
+          <a:blip r:embed="rId3"/>
+          <a:stretch>
+            <a:fillRect/>
+          </a:stretch>
+        </p:blipFill>
+        <p:spPr>
+          <a:xfrm>
+            <a:off x="4530396" y="3782860"/>
+            <a:ext cx="6141278" cy="4173916"/>
+          </a:xfrm>
+          <a:prstGeom prst="rect">
+            <a:avLst/>
+          </a:prstGeom>
+        </p:spPr>
+      </p:pic>
+      <p:sp>
+        <p:nvSpPr>
+          <p:cNvPr id="5" name="TextBox 4">
+            <a:extLst>
+              <a:ext uri="{FF2B5EF4-FFF2-40B4-BE49-F238E27FC236}">
+                <a16:creationId xmlns:a16="http://schemas.microsoft.com/office/drawing/2014/main" id="{A29B43CC-1B3B-4C17-A792-978064236564}"/>
+              </a:ext>
+            </a:extLst>
+          </p:cNvPr>
+          <p:cNvSpPr txBox="1"/>
+          <p:nvPr/>
+        </p:nvSpPr>
+        <p:spPr>
+          <a:xfrm>
+            <a:off x="4530396" y="7799311"/>
+            <a:ext cx="4244037" cy="738664"/>
+          </a:xfrm>
+          <a:prstGeom prst="rect">
+            <a:avLst/>
+          </a:prstGeom>
+          <a:noFill/>
+        </p:spPr>
+        <p:txBody>
+          <a:bodyPr wrap="square" rtlCol="0">
+            <a:spAutoFit/>
+          </a:bodyPr>
+          <a:lstStyle/>
+          <a:p>
+            <a:r>
+              <a:rPr lang="en-GB" sz="1400" dirty="0" err="1">
+                <a:latin typeface="+mn-lt"/>
+              </a:rPr>
+              <a:t>Xception</a:t>
+            </a:r>
+            <a:r>
+              <a:rPr lang="en-GB" sz="1400" dirty="0">
+                <a:latin typeface="+mn-lt"/>
+              </a:rPr>
+              <a:t> architecture, </a:t>
+            </a:r>
+            <a:r>
+              <a:rPr lang="en-GB" sz="1400" dirty="0" err="1">
+                <a:latin typeface="+mn-lt"/>
+              </a:rPr>
+              <a:t>Chollet</a:t>
+            </a:r>
+            <a:r>
+              <a:rPr lang="en-GB" sz="1400" dirty="0">
+                <a:latin typeface="+mn-lt"/>
+              </a:rPr>
+              <a:t>, F. (2017). </a:t>
+            </a:r>
+            <a:r>
+              <a:rPr lang="en-GB" sz="1400" dirty="0" err="1">
+                <a:latin typeface="+mn-lt"/>
+              </a:rPr>
+              <a:t>Xception</a:t>
+            </a:r>
+            <a:r>
+              <a:rPr lang="en-GB" sz="1400" dirty="0">
+                <a:latin typeface="+mn-lt"/>
+              </a:rPr>
+              <a:t>: Deep learning with </a:t>
+            </a:r>
+            <a:r>
+              <a:rPr lang="en-GB" sz="1400" dirty="0" err="1">
+                <a:latin typeface="+mn-lt"/>
+              </a:rPr>
+              <a:t>depthwise</a:t>
+            </a:r>
+            <a:r>
+              <a:rPr lang="en-GB" sz="1400" dirty="0">
+                <a:latin typeface="+mn-lt"/>
+              </a:rPr>
+              <a:t> separable convolutions. </a:t>
+            </a:r>
+            <a:r>
+              <a:rPr lang="en-GB" sz="1400" dirty="0" err="1">
+                <a:latin typeface="+mn-lt"/>
+              </a:rPr>
+              <a:t>arXiv</a:t>
+            </a:r>
+            <a:r>
+              <a:rPr lang="en-GB" sz="1400" dirty="0">
+                <a:latin typeface="+mn-lt"/>
+              </a:rPr>
+              <a:t> preprint, 1610-02357.</a:t>
+            </a:r>
+            <a:endParaRPr lang="en-NL" sz="1400" dirty="0">
+              <a:latin typeface="+mn-lt"/>
+            </a:endParaRPr>
+          </a:p>
+        </p:txBody>
+      </p:sp>
+      <p:pic>
+        <p:nvPicPr>
+          <p:cNvPr id="6" name="Picture 5">
+            <a:extLst>
+              <a:ext uri="{FF2B5EF4-FFF2-40B4-BE49-F238E27FC236}">
+                <a16:creationId xmlns:a16="http://schemas.microsoft.com/office/drawing/2014/main" id="{E64F6B20-6EF2-4791-A9B2-D618CE519950}"/>
+              </a:ext>
+            </a:extLst>
+          </p:cNvPr>
+          <p:cNvPicPr>
+            <a:picLocks noChangeAspect="1"/>
+          </p:cNvPicPr>
+          <p:nvPr/>
+        </p:nvPicPr>
+        <p:blipFill>
+          <a:blip r:embed="rId4"/>
+          <a:stretch>
+            <a:fillRect/>
+          </a:stretch>
+        </p:blipFill>
+        <p:spPr>
+          <a:xfrm>
+            <a:off x="10668560" y="936776"/>
+            <a:ext cx="6069822" cy="3526426"/>
+          </a:xfrm>
+          <a:prstGeom prst="rect">
+            <a:avLst/>
+          </a:prstGeom>
+        </p:spPr>
+      </p:pic>
+      <p:sp>
+        <p:nvSpPr>
+          <p:cNvPr id="7" name="TextBox 6">
+            <a:extLst>
+              <a:ext uri="{FF2B5EF4-FFF2-40B4-BE49-F238E27FC236}">
+                <a16:creationId xmlns:a16="http://schemas.microsoft.com/office/drawing/2014/main" id="{B328DE9D-7BB8-49B9-AC09-45B08495B6AD}"/>
+              </a:ext>
+            </a:extLst>
+          </p:cNvPr>
+          <p:cNvSpPr txBox="1"/>
+          <p:nvPr/>
+        </p:nvSpPr>
+        <p:spPr>
+          <a:xfrm>
+            <a:off x="12438345" y="4525364"/>
+            <a:ext cx="2230354" cy="307777"/>
+          </a:xfrm>
+          <a:prstGeom prst="rect">
+            <a:avLst/>
+          </a:prstGeom>
+          <a:noFill/>
+        </p:spPr>
+        <p:txBody>
+          <a:bodyPr wrap="none" rtlCol="0">
+            <a:spAutoFit/>
+          </a:bodyPr>
+          <a:lstStyle/>
+          <a:p>
+            <a:r>
+              <a:rPr lang="en-GB" sz="1400" dirty="0">
+                <a:latin typeface="+mn-lt"/>
+              </a:rPr>
+              <a:t>Example of object detection</a:t>
+            </a:r>
+            <a:endParaRPr lang="en-NL" sz="1400" dirty="0">
+              <a:latin typeface="+mn-lt"/>
+            </a:endParaRPr>
+          </a:p>
         </p:txBody>
       </p:sp>
     </p:spTree>
@@ -4458,6 +4989,76 @@
           </a:p>
         </p:txBody>
       </p:sp>
+      <p:pic>
+        <p:nvPicPr>
+          <p:cNvPr id="4" name="Picture 3">
+            <a:extLst>
+              <a:ext uri="{FF2B5EF4-FFF2-40B4-BE49-F238E27FC236}">
+                <a16:creationId xmlns:a16="http://schemas.microsoft.com/office/drawing/2014/main" id="{42A7D432-2BAD-4451-97C5-B2DFDEE0C8AE}"/>
+              </a:ext>
+            </a:extLst>
+          </p:cNvPr>
+          <p:cNvPicPr>
+            <a:picLocks noChangeAspect="1"/>
+          </p:cNvPicPr>
+          <p:nvPr/>
+        </p:nvPicPr>
+        <p:blipFill>
+          <a:blip r:embed="rId3"/>
+          <a:stretch>
+            <a:fillRect/>
+          </a:stretch>
+        </p:blipFill>
+        <p:spPr>
+          <a:xfrm>
+            <a:off x="8183459" y="708199"/>
+            <a:ext cx="8020050" cy="4343400"/>
+          </a:xfrm>
+          <a:prstGeom prst="rect">
+            <a:avLst/>
+          </a:prstGeom>
+        </p:spPr>
+      </p:pic>
+      <p:sp>
+        <p:nvSpPr>
+          <p:cNvPr id="5" name="TextBox 4">
+            <a:extLst>
+              <a:ext uri="{FF2B5EF4-FFF2-40B4-BE49-F238E27FC236}">
+                <a16:creationId xmlns:a16="http://schemas.microsoft.com/office/drawing/2014/main" id="{8EB28DC0-9E42-43D4-9A13-D7604ABE2CEC}"/>
+              </a:ext>
+            </a:extLst>
+          </p:cNvPr>
+          <p:cNvSpPr txBox="1"/>
+          <p:nvPr/>
+        </p:nvSpPr>
+        <p:spPr>
+          <a:xfrm>
+            <a:off x="11087219" y="4897710"/>
+            <a:ext cx="2212529" cy="307777"/>
+          </a:xfrm>
+          <a:prstGeom prst="rect">
+            <a:avLst/>
+          </a:prstGeom>
+          <a:noFill/>
+        </p:spPr>
+        <p:txBody>
+          <a:bodyPr wrap="none" rtlCol="0">
+            <a:spAutoFit/>
+          </a:bodyPr>
+          <a:lstStyle/>
+          <a:p>
+            <a:r>
+              <a:rPr lang="en-GB" sz="1400" dirty="0">
+                <a:latin typeface="+mn-lt"/>
+              </a:rPr>
+              <a:t>Examples of padded images</a:t>
+            </a:r>
+            <a:endParaRPr lang="en-NL" sz="1400" dirty="0">
+              <a:latin typeface="+mn-lt"/>
+            </a:endParaRPr>
+          </a:p>
+        </p:txBody>
+      </p:sp>
     </p:spTree>
     <p:extLst>
       <p:ext uri="{BB962C8B-B14F-4D97-AF65-F5344CB8AC3E}">
@@ -4548,28 +5149,27 @@
             <a:endParaRPr lang="en-GB" dirty="0"/>
           </a:p>
           <a:p>
-            <a:pPr lvl="1"/>
+            <a:pPr lvl="1">
+              <a:buFont typeface="Courier New" panose="02070309020205020404" pitchFamily="49" charset="0"/>
+              <a:buChar char="o"/>
+            </a:pPr>
             <a:r>
               <a:rPr lang="en-GB" dirty="0"/>
               <a:t>Soft voting</a:t>
             </a:r>
           </a:p>
           <a:p>
-            <a:pPr lvl="1"/>
+            <a:pPr lvl="1">
+              <a:buFont typeface="Courier New" panose="02070309020205020404" pitchFamily="49" charset="0"/>
+              <a:buChar char="o"/>
+            </a:pPr>
             <a:r>
               <a:rPr lang="en-GB" dirty="0" err="1"/>
               <a:t>Partical</a:t>
             </a:r>
             <a:r>
               <a:rPr lang="en-GB" dirty="0"/>
-              <a:t> Swarm optimization</a:t>
-            </a:r>
-          </a:p>
-          <a:p>
-            <a:pPr lvl="2"/>
-            <a:r>
-              <a:rPr lang="en-GB" dirty="0"/>
-              <a:t>Minimize the binary cross entropy</a:t>
+              <a:t> Swarm Optimization</a:t>
             </a:r>
           </a:p>
           <a:p>
@@ -4579,24 +5179,14 @@
             </a:r>
           </a:p>
           <a:p>
-            <a:pPr lvl="1"/>
+            <a:pPr lvl="1">
+              <a:buFont typeface="Courier New" panose="02070309020205020404" pitchFamily="49" charset="0"/>
+              <a:buChar char="o"/>
+            </a:pPr>
             <a:r>
               <a:rPr lang="en-GB" dirty="0"/>
               <a:t>Finding optimal thresholds per label</a:t>
             </a:r>
-          </a:p>
-          <a:p>
-            <a:pPr lvl="2"/>
-            <a:r>
-              <a:rPr lang="en-GB" dirty="0"/>
-              <a:t>Trying different thresholds per label</a:t>
-            </a:r>
-          </a:p>
-          <a:p>
-            <a:pPr marL="0" indent="0">
-              <a:buNone/>
-            </a:pPr>
-            <a:endParaRPr lang="en-GB" dirty="0"/>
           </a:p>
           <a:p>
             <a:pPr lvl="1"/>
@@ -4850,15 +5440,23 @@
           <a:p>
             <a:r>
               <a:rPr lang="en-GB" dirty="0"/>
-              <a:t>Google </a:t>
-            </a:r>
-            <a:r>
-              <a:rPr lang="en-GB"/>
-              <a:t>Cloud challenges</a:t>
-            </a:r>
-          </a:p>
-          <a:p>
-            <a:endParaRPr lang="en-NL"/>
+              <a:t>GCP</a:t>
+            </a:r>
+          </a:p>
+          <a:p>
+            <a:r>
+              <a:rPr lang="en-GB" dirty="0"/>
+              <a:t>Simplicity vs Over-Engineering</a:t>
+            </a:r>
+          </a:p>
+          <a:p>
+            <a:r>
+              <a:rPr lang="en-GB" dirty="0"/>
+              <a:t>Stick with the basics (… initially)</a:t>
+            </a:r>
+          </a:p>
+          <a:p>
+            <a:endParaRPr lang="en-NL" dirty="0"/>
           </a:p>
         </p:txBody>
       </p:sp>

</xml_diff>